<commit_message>
Design & Analysis phase compilation
Compiled sequence diagram for View Treatment Logs (Counsellor feature)
</commit_message>
<xml_diff>
--- a/Ying Hao/Software Engineering/Mock UI.pptx
+++ b/Ying Hao/Software Engineering/Mock UI.pptx
@@ -1236,7 +1236,7 @@
           <a:p>
             <a:fld id="{4A4F83D9-B73B-4E35-8818-2971AD8B9377}" type="datetimeFigureOut">
               <a:rPr lang="en-SG" smtClean="0"/>
-              <a:t>13/9/2016</a:t>
+              <a:t>18/9/2016</a:t>
             </a:fld>
             <a:endParaRPr lang="en-SG" dirty="0"/>
           </a:p>
@@ -7698,7 +7698,7 @@
           <a:p>
             <a:fld id="{10F1E95A-8281-4698-8997-E14162BF1168}" type="datetimeFigureOut">
               <a:rPr lang="en-SG" smtClean="0"/>
-              <a:t>13/9/2016</a:t>
+              <a:t>18/9/2016</a:t>
             </a:fld>
             <a:endParaRPr lang="en-SG" dirty="0"/>
           </a:p>
@@ -7868,7 +7868,7 @@
           <a:p>
             <a:fld id="{10F1E95A-8281-4698-8997-E14162BF1168}" type="datetimeFigureOut">
               <a:rPr lang="en-SG" smtClean="0"/>
-              <a:t>13/9/2016</a:t>
+              <a:t>18/9/2016</a:t>
             </a:fld>
             <a:endParaRPr lang="en-SG" dirty="0"/>
           </a:p>
@@ -8048,7 +8048,7 @@
           <a:p>
             <a:fld id="{10F1E95A-8281-4698-8997-E14162BF1168}" type="datetimeFigureOut">
               <a:rPr lang="en-SG" smtClean="0"/>
-              <a:t>13/9/2016</a:t>
+              <a:t>18/9/2016</a:t>
             </a:fld>
             <a:endParaRPr lang="en-SG" dirty="0"/>
           </a:p>
@@ -8218,7 +8218,7 @@
           <a:p>
             <a:fld id="{10F1E95A-8281-4698-8997-E14162BF1168}" type="datetimeFigureOut">
               <a:rPr lang="en-SG" smtClean="0"/>
-              <a:t>13/9/2016</a:t>
+              <a:t>18/9/2016</a:t>
             </a:fld>
             <a:endParaRPr lang="en-SG" dirty="0"/>
           </a:p>
@@ -8464,7 +8464,7 @@
           <a:p>
             <a:fld id="{10F1E95A-8281-4698-8997-E14162BF1168}" type="datetimeFigureOut">
               <a:rPr lang="en-SG" smtClean="0"/>
-              <a:t>13/9/2016</a:t>
+              <a:t>18/9/2016</a:t>
             </a:fld>
             <a:endParaRPr lang="en-SG" dirty="0"/>
           </a:p>
@@ -8696,7 +8696,7 @@
           <a:p>
             <a:fld id="{10F1E95A-8281-4698-8997-E14162BF1168}" type="datetimeFigureOut">
               <a:rPr lang="en-SG" smtClean="0"/>
-              <a:t>13/9/2016</a:t>
+              <a:t>18/9/2016</a:t>
             </a:fld>
             <a:endParaRPr lang="en-SG" dirty="0"/>
           </a:p>
@@ -9063,7 +9063,7 @@
           <a:p>
             <a:fld id="{10F1E95A-8281-4698-8997-E14162BF1168}" type="datetimeFigureOut">
               <a:rPr lang="en-SG" smtClean="0"/>
-              <a:t>13/9/2016</a:t>
+              <a:t>18/9/2016</a:t>
             </a:fld>
             <a:endParaRPr lang="en-SG" dirty="0"/>
           </a:p>
@@ -9181,7 +9181,7 @@
           <a:p>
             <a:fld id="{10F1E95A-8281-4698-8997-E14162BF1168}" type="datetimeFigureOut">
               <a:rPr lang="en-SG" smtClean="0"/>
-              <a:t>13/9/2016</a:t>
+              <a:t>18/9/2016</a:t>
             </a:fld>
             <a:endParaRPr lang="en-SG" dirty="0"/>
           </a:p>
@@ -9276,7 +9276,7 @@
           <a:p>
             <a:fld id="{10F1E95A-8281-4698-8997-E14162BF1168}" type="datetimeFigureOut">
               <a:rPr lang="en-SG" smtClean="0"/>
-              <a:t>13/9/2016</a:t>
+              <a:t>18/9/2016</a:t>
             </a:fld>
             <a:endParaRPr lang="en-SG" dirty="0"/>
           </a:p>
@@ -9553,7 +9553,7 @@
           <a:p>
             <a:fld id="{10F1E95A-8281-4698-8997-E14162BF1168}" type="datetimeFigureOut">
               <a:rPr lang="en-SG" smtClean="0"/>
-              <a:t>13/9/2016</a:t>
+              <a:t>18/9/2016</a:t>
             </a:fld>
             <a:endParaRPr lang="en-SG" dirty="0"/>
           </a:p>
@@ -9806,7 +9806,7 @@
           <a:p>
             <a:fld id="{10F1E95A-8281-4698-8997-E14162BF1168}" type="datetimeFigureOut">
               <a:rPr lang="en-SG" smtClean="0"/>
-              <a:t>13/9/2016</a:t>
+              <a:t>18/9/2016</a:t>
             </a:fld>
             <a:endParaRPr lang="en-SG" dirty="0"/>
           </a:p>
@@ -10019,7 +10019,7 @@
           <a:p>
             <a:fld id="{10F1E95A-8281-4698-8997-E14162BF1168}" type="datetimeFigureOut">
               <a:rPr lang="en-SG" smtClean="0"/>
-              <a:t>13/9/2016</a:t>
+              <a:t>18/9/2016</a:t>
             </a:fld>
             <a:endParaRPr lang="en-SG" dirty="0"/>
           </a:p>
@@ -42977,7 +42977,7 @@
         </p:nvSpPr>
         <p:spPr>
           <a:xfrm>
-            <a:off x="6930938" y="6034832"/>
+            <a:off x="7209902" y="6034832"/>
             <a:ext cx="457340" cy="296077"/>
           </a:xfrm>
           <a:prstGeom prst="roundRect">

</xml_diff>